<commit_message>
Update VI labwork / session 3-4 on shape/color detection
</commit_message>
<xml_diff>
--- a/InterfacageNumerique/TP/bloc_VI_2026/autres/Objets.pptx
+++ b/InterfacageNumerique/TP/bloc_VI_2026/autres/Objets.pptx
@@ -243,7 +243,7 @@
           <a:p>
             <a:fld id="{4FE3012F-2CE9-4275-BACF-0022BCCFD0F9}" type="datetimeFigureOut">
               <a:rPr lang="fr-FR" smtClean="0"/>
-              <a:t>27/11/2025</a:t>
+              <a:t>16/12/2025</a:t>
             </a:fld>
             <a:endParaRPr lang="fr-FR"/>
           </a:p>
@@ -413,7 +413,7 @@
           <a:p>
             <a:fld id="{4FE3012F-2CE9-4275-BACF-0022BCCFD0F9}" type="datetimeFigureOut">
               <a:rPr lang="fr-FR" smtClean="0"/>
-              <a:t>27/11/2025</a:t>
+              <a:t>16/12/2025</a:t>
             </a:fld>
             <a:endParaRPr lang="fr-FR"/>
           </a:p>
@@ -593,7 +593,7 @@
           <a:p>
             <a:fld id="{4FE3012F-2CE9-4275-BACF-0022BCCFD0F9}" type="datetimeFigureOut">
               <a:rPr lang="fr-FR" smtClean="0"/>
-              <a:t>27/11/2025</a:t>
+              <a:t>16/12/2025</a:t>
             </a:fld>
             <a:endParaRPr lang="fr-FR"/>
           </a:p>
@@ -763,7 +763,7 @@
           <a:p>
             <a:fld id="{4FE3012F-2CE9-4275-BACF-0022BCCFD0F9}" type="datetimeFigureOut">
               <a:rPr lang="fr-FR" smtClean="0"/>
-              <a:t>27/11/2025</a:t>
+              <a:t>16/12/2025</a:t>
             </a:fld>
             <a:endParaRPr lang="fr-FR"/>
           </a:p>
@@ -1009,7 +1009,7 @@
           <a:p>
             <a:fld id="{4FE3012F-2CE9-4275-BACF-0022BCCFD0F9}" type="datetimeFigureOut">
               <a:rPr lang="fr-FR" smtClean="0"/>
-              <a:t>27/11/2025</a:t>
+              <a:t>16/12/2025</a:t>
             </a:fld>
             <a:endParaRPr lang="fr-FR"/>
           </a:p>
@@ -1241,7 +1241,7 @@
           <a:p>
             <a:fld id="{4FE3012F-2CE9-4275-BACF-0022BCCFD0F9}" type="datetimeFigureOut">
               <a:rPr lang="fr-FR" smtClean="0"/>
-              <a:t>27/11/2025</a:t>
+              <a:t>16/12/2025</a:t>
             </a:fld>
             <a:endParaRPr lang="fr-FR"/>
           </a:p>
@@ -1608,7 +1608,7 @@
           <a:p>
             <a:fld id="{4FE3012F-2CE9-4275-BACF-0022BCCFD0F9}" type="datetimeFigureOut">
               <a:rPr lang="fr-FR" smtClean="0"/>
-              <a:t>27/11/2025</a:t>
+              <a:t>16/12/2025</a:t>
             </a:fld>
             <a:endParaRPr lang="fr-FR"/>
           </a:p>
@@ -1726,7 +1726,7 @@
           <a:p>
             <a:fld id="{4FE3012F-2CE9-4275-BACF-0022BCCFD0F9}" type="datetimeFigureOut">
               <a:rPr lang="fr-FR" smtClean="0"/>
-              <a:t>27/11/2025</a:t>
+              <a:t>16/12/2025</a:t>
             </a:fld>
             <a:endParaRPr lang="fr-FR"/>
           </a:p>
@@ -1821,7 +1821,7 @@
           <a:p>
             <a:fld id="{4FE3012F-2CE9-4275-BACF-0022BCCFD0F9}" type="datetimeFigureOut">
               <a:rPr lang="fr-FR" smtClean="0"/>
-              <a:t>27/11/2025</a:t>
+              <a:t>16/12/2025</a:t>
             </a:fld>
             <a:endParaRPr lang="fr-FR"/>
           </a:p>
@@ -2098,7 +2098,7 @@
           <a:p>
             <a:fld id="{4FE3012F-2CE9-4275-BACF-0022BCCFD0F9}" type="datetimeFigureOut">
               <a:rPr lang="fr-FR" smtClean="0"/>
-              <a:t>27/11/2025</a:t>
+              <a:t>16/12/2025</a:t>
             </a:fld>
             <a:endParaRPr lang="fr-FR"/>
           </a:p>
@@ -2355,7 +2355,7 @@
           <a:p>
             <a:fld id="{4FE3012F-2CE9-4275-BACF-0022BCCFD0F9}" type="datetimeFigureOut">
               <a:rPr lang="fr-FR" smtClean="0"/>
-              <a:t>27/11/2025</a:t>
+              <a:t>16/12/2025</a:t>
             </a:fld>
             <a:endParaRPr lang="fr-FR"/>
           </a:p>
@@ -2568,7 +2568,7 @@
           <a:p>
             <a:fld id="{4FE3012F-2CE9-4275-BACF-0022BCCFD0F9}" type="datetimeFigureOut">
               <a:rPr lang="fr-FR" smtClean="0"/>
-              <a:t>27/11/2025</a:t>
+              <a:t>16/12/2025</a:t>
             </a:fld>
             <a:endParaRPr lang="fr-FR"/>
           </a:p>
@@ -2975,6 +2975,55 @@
       </p:grpSpPr>
       <p:sp>
         <p:nvSpPr>
+          <p:cNvPr id="12" name="Rectangle 11">
+            <a:extLst>
+              <a:ext uri="{FF2B5EF4-FFF2-40B4-BE49-F238E27FC236}">
+                <a16:creationId xmlns:a16="http://schemas.microsoft.com/office/drawing/2014/main" id="{DDB796D5-7857-C3E1-2819-88A00EDDB1A8}"/>
+              </a:ext>
+            </a:extLst>
+          </p:cNvPr>
+          <p:cNvSpPr/>
+          <p:nvPr/>
+        </p:nvSpPr>
+        <p:spPr>
+          <a:xfrm>
+            <a:off x="863600" y="349250"/>
+            <a:ext cx="6235700" cy="4400550"/>
+          </a:xfrm>
+          <a:prstGeom prst="rect">
+            <a:avLst/>
+          </a:prstGeom>
+          <a:solidFill>
+            <a:schemeClr val="tx1"/>
+          </a:solidFill>
+        </p:spPr>
+        <p:style>
+          <a:lnRef idx="2">
+            <a:schemeClr val="accent1">
+              <a:shade val="15000"/>
+            </a:schemeClr>
+          </a:lnRef>
+          <a:fillRef idx="1">
+            <a:schemeClr val="accent1"/>
+          </a:fillRef>
+          <a:effectRef idx="0">
+            <a:schemeClr val="accent1"/>
+          </a:effectRef>
+          <a:fontRef idx="minor">
+            <a:schemeClr val="lt1"/>
+          </a:fontRef>
+        </p:style>
+        <p:txBody>
+          <a:bodyPr rtlCol="0" anchor="ctr"/>
+          <a:lstStyle/>
+          <a:p>
+            <a:pPr algn="ctr"/>
+            <a:endParaRPr lang="fr-FR"/>
+          </a:p>
+        </p:txBody>
+      </p:sp>
+      <p:sp>
+        <p:nvSpPr>
           <p:cNvPr id="3" name="Rectangle 2">
             <a:extLst>
               <a:ext uri="{FF2B5EF4-FFF2-40B4-BE49-F238E27FC236}">
@@ -3202,7 +3251,7 @@
         <p:spPr>
           <a:xfrm>
             <a:off x="5381434" y="1533379"/>
-            <a:ext cx="1008036" cy="792018"/>
+            <a:ext cx="822418" cy="792018"/>
           </a:xfrm>
           <a:prstGeom prst="pentagon">
             <a:avLst/>
@@ -3314,6 +3363,377 @@
             <a:schemeClr val="accent6">
               <a:lumMod val="50000"/>
             </a:schemeClr>
+          </a:solidFill>
+          <a:ln>
+            <a:noFill/>
+          </a:ln>
+        </p:spPr>
+        <p:style>
+          <a:lnRef idx="2">
+            <a:schemeClr val="accent1">
+              <a:shade val="15000"/>
+            </a:schemeClr>
+          </a:lnRef>
+          <a:fillRef idx="1">
+            <a:schemeClr val="accent1"/>
+          </a:fillRef>
+          <a:effectRef idx="0">
+            <a:schemeClr val="accent1"/>
+          </a:effectRef>
+          <a:fontRef idx="minor">
+            <a:schemeClr val="lt1"/>
+          </a:fontRef>
+        </p:style>
+        <p:txBody>
+          <a:bodyPr rtlCol="0" anchor="ctr"/>
+          <a:lstStyle/>
+          <a:p>
+            <a:pPr algn="ctr"/>
+            <a:endParaRPr lang="fr-FR"/>
+          </a:p>
+        </p:txBody>
+      </p:sp>
+      <p:sp>
+        <p:nvSpPr>
+          <p:cNvPr id="2" name="Hexagone 1">
+            <a:extLst>
+              <a:ext uri="{FF2B5EF4-FFF2-40B4-BE49-F238E27FC236}">
+                <a16:creationId xmlns:a16="http://schemas.microsoft.com/office/drawing/2014/main" id="{91CF6DB4-D000-F4E0-7FD1-561D883356F9}"/>
+              </a:ext>
+            </a:extLst>
+          </p:cNvPr>
+          <p:cNvSpPr/>
+          <p:nvPr/>
+        </p:nvSpPr>
+        <p:spPr>
+          <a:xfrm>
+            <a:off x="2620954" y="7292484"/>
+            <a:ext cx="717452" cy="668502"/>
+          </a:xfrm>
+          <a:prstGeom prst="hexagon">
+            <a:avLst/>
+          </a:prstGeom>
+          <a:solidFill>
+            <a:schemeClr val="accent2">
+              <a:lumMod val="75000"/>
+            </a:schemeClr>
+          </a:solidFill>
+          <a:ln>
+            <a:noFill/>
+          </a:ln>
+        </p:spPr>
+        <p:style>
+          <a:lnRef idx="2">
+            <a:schemeClr val="accent1">
+              <a:shade val="15000"/>
+            </a:schemeClr>
+          </a:lnRef>
+          <a:fillRef idx="1">
+            <a:schemeClr val="accent1"/>
+          </a:fillRef>
+          <a:effectRef idx="0">
+            <a:schemeClr val="accent1"/>
+          </a:effectRef>
+          <a:fontRef idx="minor">
+            <a:schemeClr val="lt1"/>
+          </a:fontRef>
+        </p:style>
+        <p:txBody>
+          <a:bodyPr rtlCol="0" anchor="ctr"/>
+          <a:lstStyle/>
+          <a:p>
+            <a:pPr algn="ctr"/>
+            <a:endParaRPr lang="fr-FR"/>
+          </a:p>
+        </p:txBody>
+      </p:sp>
+      <p:sp>
+        <p:nvSpPr>
+          <p:cNvPr id="4" name="Hexagone 3">
+            <a:extLst>
+              <a:ext uri="{FF2B5EF4-FFF2-40B4-BE49-F238E27FC236}">
+                <a16:creationId xmlns:a16="http://schemas.microsoft.com/office/drawing/2014/main" id="{7B37AE82-0DA5-BCDC-E261-8C2642003467}"/>
+              </a:ext>
+            </a:extLst>
+          </p:cNvPr>
+          <p:cNvSpPr/>
+          <p:nvPr/>
+        </p:nvSpPr>
+        <p:spPr>
+          <a:xfrm>
+            <a:off x="3858547" y="7444884"/>
+            <a:ext cx="717452" cy="668502"/>
+          </a:xfrm>
+          <a:prstGeom prst="hexagon">
+            <a:avLst/>
+          </a:prstGeom>
+          <a:solidFill>
+            <a:schemeClr val="accent2">
+              <a:lumMod val="75000"/>
+            </a:schemeClr>
+          </a:solidFill>
+          <a:ln>
+            <a:noFill/>
+          </a:ln>
+        </p:spPr>
+        <p:style>
+          <a:lnRef idx="2">
+            <a:schemeClr val="accent1">
+              <a:shade val="15000"/>
+            </a:schemeClr>
+          </a:lnRef>
+          <a:fillRef idx="1">
+            <a:schemeClr val="accent1"/>
+          </a:fillRef>
+          <a:effectRef idx="0">
+            <a:schemeClr val="accent1"/>
+          </a:effectRef>
+          <a:fontRef idx="minor">
+            <a:schemeClr val="lt1"/>
+          </a:fontRef>
+        </p:style>
+        <p:txBody>
+          <a:bodyPr rtlCol="0" anchor="ctr"/>
+          <a:lstStyle/>
+          <a:p>
+            <a:pPr algn="ctr"/>
+            <a:endParaRPr lang="fr-FR"/>
+          </a:p>
+        </p:txBody>
+      </p:sp>
+      <p:sp>
+        <p:nvSpPr>
+          <p:cNvPr id="5" name="Hexagone 4">
+            <a:extLst>
+              <a:ext uri="{FF2B5EF4-FFF2-40B4-BE49-F238E27FC236}">
+                <a16:creationId xmlns:a16="http://schemas.microsoft.com/office/drawing/2014/main" id="{1AB3BC09-3A87-7524-6257-297ECB943958}"/>
+              </a:ext>
+            </a:extLst>
+          </p:cNvPr>
+          <p:cNvSpPr/>
+          <p:nvPr/>
+        </p:nvSpPr>
+        <p:spPr>
+          <a:xfrm>
+            <a:off x="5096140" y="7292484"/>
+            <a:ext cx="717452" cy="668502"/>
+          </a:xfrm>
+          <a:prstGeom prst="hexagon">
+            <a:avLst/>
+          </a:prstGeom>
+          <a:solidFill>
+            <a:schemeClr val="accent2">
+              <a:lumMod val="75000"/>
+            </a:schemeClr>
+          </a:solidFill>
+          <a:ln>
+            <a:noFill/>
+          </a:ln>
+        </p:spPr>
+        <p:style>
+          <a:lnRef idx="2">
+            <a:schemeClr val="accent1">
+              <a:shade val="15000"/>
+            </a:schemeClr>
+          </a:lnRef>
+          <a:fillRef idx="1">
+            <a:schemeClr val="accent1"/>
+          </a:fillRef>
+          <a:effectRef idx="0">
+            <a:schemeClr val="accent1"/>
+          </a:effectRef>
+          <a:fontRef idx="minor">
+            <a:schemeClr val="lt1"/>
+          </a:fontRef>
+        </p:style>
+        <p:txBody>
+          <a:bodyPr rtlCol="0" anchor="ctr"/>
+          <a:lstStyle/>
+          <a:p>
+            <a:pPr algn="ctr"/>
+            <a:endParaRPr lang="fr-FR"/>
+          </a:p>
+        </p:txBody>
+      </p:sp>
+      <p:sp>
+        <p:nvSpPr>
+          <p:cNvPr id="6" name="Hexagone 5">
+            <a:extLst>
+              <a:ext uri="{FF2B5EF4-FFF2-40B4-BE49-F238E27FC236}">
+                <a16:creationId xmlns:a16="http://schemas.microsoft.com/office/drawing/2014/main" id="{2EAF4EB5-7076-86AD-F267-05F1F15D3BE7}"/>
+              </a:ext>
+            </a:extLst>
+          </p:cNvPr>
+          <p:cNvSpPr/>
+          <p:nvPr/>
+        </p:nvSpPr>
+        <p:spPr>
+          <a:xfrm>
+            <a:off x="3162071" y="8564792"/>
+            <a:ext cx="717452" cy="668502"/>
+          </a:xfrm>
+          <a:prstGeom prst="hexagon">
+            <a:avLst/>
+          </a:prstGeom>
+          <a:solidFill>
+            <a:schemeClr val="accent2">
+              <a:lumMod val="75000"/>
+            </a:schemeClr>
+          </a:solidFill>
+          <a:ln>
+            <a:noFill/>
+          </a:ln>
+        </p:spPr>
+        <p:style>
+          <a:lnRef idx="2">
+            <a:schemeClr val="accent1">
+              <a:shade val="15000"/>
+            </a:schemeClr>
+          </a:lnRef>
+          <a:fillRef idx="1">
+            <a:schemeClr val="accent1"/>
+          </a:fillRef>
+          <a:effectRef idx="0">
+            <a:schemeClr val="accent1"/>
+          </a:effectRef>
+          <a:fontRef idx="minor">
+            <a:schemeClr val="lt1"/>
+          </a:fontRef>
+        </p:style>
+        <p:txBody>
+          <a:bodyPr rtlCol="0" anchor="ctr"/>
+          <a:lstStyle/>
+          <a:p>
+            <a:pPr algn="ctr"/>
+            <a:endParaRPr lang="fr-FR"/>
+          </a:p>
+        </p:txBody>
+      </p:sp>
+      <p:sp>
+        <p:nvSpPr>
+          <p:cNvPr id="8" name="Hexagone 7">
+            <a:extLst>
+              <a:ext uri="{FF2B5EF4-FFF2-40B4-BE49-F238E27FC236}">
+                <a16:creationId xmlns:a16="http://schemas.microsoft.com/office/drawing/2014/main" id="{9D706E05-2A7E-BAFE-AC5F-20F826B5835A}"/>
+              </a:ext>
+            </a:extLst>
+          </p:cNvPr>
+          <p:cNvSpPr/>
+          <p:nvPr/>
+        </p:nvSpPr>
+        <p:spPr>
+          <a:xfrm>
+            <a:off x="4378688" y="8993950"/>
+            <a:ext cx="717452" cy="668502"/>
+          </a:xfrm>
+          <a:prstGeom prst="hexagon">
+            <a:avLst/>
+          </a:prstGeom>
+          <a:solidFill>
+            <a:schemeClr val="accent2">
+              <a:lumMod val="75000"/>
+            </a:schemeClr>
+          </a:solidFill>
+          <a:ln>
+            <a:noFill/>
+          </a:ln>
+        </p:spPr>
+        <p:style>
+          <a:lnRef idx="2">
+            <a:schemeClr val="accent1">
+              <a:shade val="15000"/>
+            </a:schemeClr>
+          </a:lnRef>
+          <a:fillRef idx="1">
+            <a:schemeClr val="accent1"/>
+          </a:fillRef>
+          <a:effectRef idx="0">
+            <a:schemeClr val="accent1"/>
+          </a:effectRef>
+          <a:fontRef idx="minor">
+            <a:schemeClr val="lt1"/>
+          </a:fontRef>
+        </p:style>
+        <p:txBody>
+          <a:bodyPr rtlCol="0" anchor="ctr"/>
+          <a:lstStyle/>
+          <a:p>
+            <a:pPr algn="ctr"/>
+            <a:endParaRPr lang="fr-FR"/>
+          </a:p>
+        </p:txBody>
+      </p:sp>
+      <p:sp>
+        <p:nvSpPr>
+          <p:cNvPr id="9" name="Pentagone 8">
+            <a:extLst>
+              <a:ext uri="{FF2B5EF4-FFF2-40B4-BE49-F238E27FC236}">
+                <a16:creationId xmlns:a16="http://schemas.microsoft.com/office/drawing/2014/main" id="{84E5B345-1B9E-2376-73A9-9EF2D9F90F6A}"/>
+              </a:ext>
+            </a:extLst>
+          </p:cNvPr>
+          <p:cNvSpPr/>
+          <p:nvPr/>
+        </p:nvSpPr>
+        <p:spPr>
+          <a:xfrm>
+            <a:off x="2540911" y="793796"/>
+            <a:ext cx="283483" cy="235565"/>
+          </a:xfrm>
+          <a:prstGeom prst="pentagon">
+            <a:avLst/>
+          </a:prstGeom>
+          <a:ln>
+            <a:noFill/>
+          </a:ln>
+        </p:spPr>
+        <p:style>
+          <a:lnRef idx="2">
+            <a:schemeClr val="accent1">
+              <a:shade val="15000"/>
+            </a:schemeClr>
+          </a:lnRef>
+          <a:fillRef idx="1">
+            <a:schemeClr val="accent1"/>
+          </a:fillRef>
+          <a:effectRef idx="0">
+            <a:schemeClr val="accent1"/>
+          </a:effectRef>
+          <a:fontRef idx="minor">
+            <a:schemeClr val="lt1"/>
+          </a:fontRef>
+        </p:style>
+        <p:txBody>
+          <a:bodyPr rtlCol="0" anchor="ctr"/>
+          <a:lstStyle/>
+          <a:p>
+            <a:pPr algn="ctr"/>
+            <a:endParaRPr lang="fr-FR"/>
+          </a:p>
+        </p:txBody>
+      </p:sp>
+      <p:sp>
+        <p:nvSpPr>
+          <p:cNvPr id="10" name="Rectangle 9">
+            <a:extLst>
+              <a:ext uri="{FF2B5EF4-FFF2-40B4-BE49-F238E27FC236}">
+                <a16:creationId xmlns:a16="http://schemas.microsoft.com/office/drawing/2014/main" id="{498F8138-A15A-9591-5378-8A62EE9DEB0A}"/>
+              </a:ext>
+            </a:extLst>
+          </p:cNvPr>
+          <p:cNvSpPr/>
+          <p:nvPr/>
+        </p:nvSpPr>
+        <p:spPr>
+          <a:xfrm rot="2213007">
+            <a:off x="3377111" y="1630114"/>
+            <a:ext cx="60223" cy="399086"/>
+          </a:xfrm>
+          <a:prstGeom prst="rect">
+            <a:avLst/>
+          </a:prstGeom>
+          <a:solidFill>
+            <a:srgbClr val="00B050"/>
           </a:solidFill>
           <a:ln>
             <a:noFill/>

</xml_diff>